<commit_message>
feat: final eda's done, drawing graphs' left
</commit_message>
<xml_diff>
--- a/220704/220704_EDA_왓고컴코_PPT_V2.pptx
+++ b/220704/220704_EDA_왓고컴코_PPT_V2.pptx
@@ -4178,7 +4178,55 @@
           <a:bodyPr/>
           <a:lstStyle/>
           <a:p>
-            <a:endParaRPr lang="ko-KR" altLang="en-US" dirty="0"/>
+            <a:r>
+              <a:rPr lang="ko-KR" altLang="en-US" dirty="0"/>
+              <a:t>전체적인 데이터 분포가 동일해서 신뢰성이 있다</a:t>
+            </a:r>
+            <a:r>
+              <a:rPr lang="en-US" altLang="ko-KR" dirty="0"/>
+              <a:t>.</a:t>
+            </a:r>
+          </a:p>
+          <a:p>
+            <a:endParaRPr lang="en-US" altLang="ko-KR" dirty="0"/>
+          </a:p>
+          <a:p>
+            <a:r>
+              <a:rPr lang="ko-KR" altLang="en-US" dirty="0"/>
+              <a:t>최상위 </a:t>
+            </a:r>
+            <a:r>
+              <a:rPr lang="ko-KR" altLang="en-US" dirty="0" err="1"/>
+              <a:t>티어인</a:t>
+            </a:r>
+            <a:r>
+              <a:rPr lang="ko-KR" altLang="en-US" dirty="0"/>
+              <a:t> </a:t>
+            </a:r>
+            <a:r>
+              <a:rPr lang="ko-KR" altLang="en-US" dirty="0" err="1"/>
+              <a:t>그마와</a:t>
+            </a:r>
+            <a:r>
+              <a:rPr lang="ko-KR" altLang="en-US" dirty="0"/>
+              <a:t> </a:t>
+            </a:r>
+            <a:r>
+              <a:rPr lang="ko-KR" altLang="en-US" dirty="0" err="1"/>
+              <a:t>챌이</a:t>
+            </a:r>
+            <a:r>
+              <a:rPr lang="ko-KR" altLang="en-US" dirty="0"/>
+              <a:t> </a:t>
+            </a:r>
+            <a:r>
+              <a:rPr lang="ko-KR" altLang="en-US" dirty="0" err="1"/>
+              <a:t>없다는게</a:t>
+            </a:r>
+            <a:r>
+              <a:rPr lang="ko-KR" altLang="en-US" dirty="0"/>
+              <a:t> 아쉽</a:t>
+            </a:r>
           </a:p>
         </p:txBody>
       </p:sp>
@@ -4293,6 +4341,280 @@
     <p:extLst>
       <p:ext uri="{BB962C8B-B14F-4D97-AF65-F5344CB8AC3E}">
         <p14:creationId xmlns:p14="http://schemas.microsoft.com/office/powerpoint/2010/main" val="970826323"/>
+      </p:ext>
+    </p:extLst>
+  </p:cSld>
+  <p:clrMapOvr>
+    <a:masterClrMapping/>
+  </p:clrMapOvr>
+</p:notes>
+</file>
+
+<file path=ppt/notesSlides/notesSlide5.xml><?xml version="1.0" encoding="utf-8"?>
+<p:notes xmlns:a="http://schemas.openxmlformats.org/drawingml/2006/main" xmlns:r="http://schemas.openxmlformats.org/officeDocument/2006/relationships" xmlns:p="http://schemas.openxmlformats.org/presentationml/2006/main">
+  <p:cSld>
+    <p:spTree>
+      <p:nvGrpSpPr>
+        <p:cNvPr id="1" name=""/>
+        <p:cNvGrpSpPr/>
+        <p:nvPr/>
+      </p:nvGrpSpPr>
+      <p:grpSpPr>
+        <a:xfrm>
+          <a:off x="0" y="0"/>
+          <a:ext cx="0" cy="0"/>
+          <a:chOff x="0" y="0"/>
+          <a:chExt cx="0" cy="0"/>
+        </a:xfrm>
+      </p:grpSpPr>
+      <p:sp>
+        <p:nvSpPr>
+          <p:cNvPr id="2" name="슬라이드 이미지 개체 틀 1"/>
+          <p:cNvSpPr>
+            <a:spLocks noGrp="1" noRot="1" noChangeAspect="1"/>
+          </p:cNvSpPr>
+          <p:nvPr>
+            <p:ph type="sldImg"/>
+          </p:nvPr>
+        </p:nvSpPr>
+        <p:spPr/>
+      </p:sp>
+      <p:sp>
+        <p:nvSpPr>
+          <p:cNvPr id="3" name="슬라이드 노트 개체 틀 2"/>
+          <p:cNvSpPr>
+            <a:spLocks noGrp="1"/>
+          </p:cNvSpPr>
+          <p:nvPr>
+            <p:ph type="body" idx="1"/>
+          </p:nvPr>
+        </p:nvSpPr>
+        <p:spPr/>
+        <p:txBody>
+          <a:bodyPr/>
+          <a:lstStyle/>
+          <a:p>
+            <a:r>
+              <a:rPr lang="ko-KR" altLang="en-US" dirty="0"/>
+              <a:t>사실 모드별로 분석은 잘 모르겠다</a:t>
+            </a:r>
+            <a:r>
+              <a:rPr lang="en-US" altLang="ko-KR" dirty="0"/>
+              <a:t>.</a:t>
+            </a:r>
+            <a:endParaRPr lang="ko-KR" altLang="en-US" dirty="0"/>
+          </a:p>
+        </p:txBody>
+      </p:sp>
+      <p:sp>
+        <p:nvSpPr>
+          <p:cNvPr id="4" name="슬라이드 번호 개체 틀 3"/>
+          <p:cNvSpPr>
+            <a:spLocks noGrp="1"/>
+          </p:cNvSpPr>
+          <p:nvPr>
+            <p:ph type="sldNum" sz="quarter" idx="5"/>
+          </p:nvPr>
+        </p:nvSpPr>
+        <p:spPr/>
+        <p:txBody>
+          <a:bodyPr/>
+          <a:lstStyle/>
+          <a:p>
+            <a:fld id="{BE5E9F10-D1AF-43F7-8028-F2E1ABB3DCEC}" type="slidenum">
+              <a:rPr lang="ko-KR" altLang="en-US" smtClean="0"/>
+              <a:t>11</a:t>
+            </a:fld>
+            <a:endParaRPr lang="ko-KR" altLang="en-US"/>
+          </a:p>
+        </p:txBody>
+      </p:sp>
+    </p:spTree>
+    <p:extLst>
+      <p:ext uri="{BB962C8B-B14F-4D97-AF65-F5344CB8AC3E}">
+        <p14:creationId xmlns:p14="http://schemas.microsoft.com/office/powerpoint/2010/main" val="2702787085"/>
+      </p:ext>
+    </p:extLst>
+  </p:cSld>
+  <p:clrMapOvr>
+    <a:masterClrMapping/>
+  </p:clrMapOvr>
+</p:notes>
+</file>
+
+<file path=ppt/notesSlides/notesSlide6.xml><?xml version="1.0" encoding="utf-8"?>
+<p:notes xmlns:a="http://schemas.openxmlformats.org/drawingml/2006/main" xmlns:r="http://schemas.openxmlformats.org/officeDocument/2006/relationships" xmlns:p="http://schemas.openxmlformats.org/presentationml/2006/main">
+  <p:cSld>
+    <p:spTree>
+      <p:nvGrpSpPr>
+        <p:cNvPr id="1" name=""/>
+        <p:cNvGrpSpPr/>
+        <p:nvPr/>
+      </p:nvGrpSpPr>
+      <p:grpSpPr>
+        <a:xfrm>
+          <a:off x="0" y="0"/>
+          <a:ext cx="0" cy="0"/>
+          <a:chOff x="0" y="0"/>
+          <a:chExt cx="0" cy="0"/>
+        </a:xfrm>
+      </p:grpSpPr>
+      <p:sp>
+        <p:nvSpPr>
+          <p:cNvPr id="2" name="슬라이드 이미지 개체 틀 1"/>
+          <p:cNvSpPr>
+            <a:spLocks noGrp="1" noRot="1" noChangeAspect="1"/>
+          </p:cNvSpPr>
+          <p:nvPr>
+            <p:ph type="sldImg"/>
+          </p:nvPr>
+        </p:nvSpPr>
+        <p:spPr/>
+      </p:sp>
+      <p:sp>
+        <p:nvSpPr>
+          <p:cNvPr id="3" name="슬라이드 노트 개체 틀 2"/>
+          <p:cNvSpPr>
+            <a:spLocks noGrp="1"/>
+          </p:cNvSpPr>
+          <p:nvPr>
+            <p:ph type="body" idx="1"/>
+          </p:nvPr>
+        </p:nvSpPr>
+        <p:spPr/>
+        <p:txBody>
+          <a:bodyPr/>
+          <a:lstStyle/>
+          <a:p>
+            <a:r>
+              <a:rPr lang="ko-KR" altLang="en-US" dirty="0"/>
+              <a:t>포지션 별 분석</a:t>
+            </a:r>
+          </a:p>
+        </p:txBody>
+      </p:sp>
+      <p:sp>
+        <p:nvSpPr>
+          <p:cNvPr id="4" name="슬라이드 번호 개체 틀 3"/>
+          <p:cNvSpPr>
+            <a:spLocks noGrp="1"/>
+          </p:cNvSpPr>
+          <p:nvPr>
+            <p:ph type="sldNum" sz="quarter" idx="5"/>
+          </p:nvPr>
+        </p:nvSpPr>
+        <p:spPr/>
+        <p:txBody>
+          <a:bodyPr/>
+          <a:lstStyle/>
+          <a:p>
+            <a:fld id="{BE5E9F10-D1AF-43F7-8028-F2E1ABB3DCEC}" type="slidenum">
+              <a:rPr lang="ko-KR" altLang="en-US" smtClean="0"/>
+              <a:t>12</a:t>
+            </a:fld>
+            <a:endParaRPr lang="ko-KR" altLang="en-US"/>
+          </a:p>
+        </p:txBody>
+      </p:sp>
+    </p:spTree>
+    <p:extLst>
+      <p:ext uri="{BB962C8B-B14F-4D97-AF65-F5344CB8AC3E}">
+        <p14:creationId xmlns:p14="http://schemas.microsoft.com/office/powerpoint/2010/main" val="1959015065"/>
+      </p:ext>
+    </p:extLst>
+  </p:cSld>
+  <p:clrMapOvr>
+    <a:masterClrMapping/>
+  </p:clrMapOvr>
+</p:notes>
+</file>
+
+<file path=ppt/notesSlides/notesSlide7.xml><?xml version="1.0" encoding="utf-8"?>
+<p:notes xmlns:a="http://schemas.openxmlformats.org/drawingml/2006/main" xmlns:r="http://schemas.openxmlformats.org/officeDocument/2006/relationships" xmlns:p="http://schemas.openxmlformats.org/presentationml/2006/main">
+  <p:cSld>
+    <p:spTree>
+      <p:nvGrpSpPr>
+        <p:cNvPr id="1" name=""/>
+        <p:cNvGrpSpPr/>
+        <p:nvPr/>
+      </p:nvGrpSpPr>
+      <p:grpSpPr>
+        <a:xfrm>
+          <a:off x="0" y="0"/>
+          <a:ext cx="0" cy="0"/>
+          <a:chOff x="0" y="0"/>
+          <a:chExt cx="0" cy="0"/>
+        </a:xfrm>
+      </p:grpSpPr>
+      <p:sp>
+        <p:nvSpPr>
+          <p:cNvPr id="2" name="슬라이드 이미지 개체 틀 1"/>
+          <p:cNvSpPr>
+            <a:spLocks noGrp="1" noRot="1" noChangeAspect="1"/>
+          </p:cNvSpPr>
+          <p:nvPr>
+            <p:ph type="sldImg"/>
+          </p:nvPr>
+        </p:nvSpPr>
+        <p:spPr/>
+      </p:sp>
+      <p:sp>
+        <p:nvSpPr>
+          <p:cNvPr id="3" name="슬라이드 노트 개체 틀 2"/>
+          <p:cNvSpPr>
+            <a:spLocks noGrp="1"/>
+          </p:cNvSpPr>
+          <p:nvPr>
+            <p:ph type="body" idx="1"/>
+          </p:nvPr>
+        </p:nvSpPr>
+        <p:spPr/>
+        <p:txBody>
+          <a:bodyPr/>
+          <a:lstStyle/>
+          <a:p>
+            <a:r>
+              <a:rPr lang="ko-KR" altLang="en-US" dirty="0"/>
+              <a:t>모드별로 승</a:t>
+            </a:r>
+            <a:r>
+              <a:rPr lang="en-US" altLang="ko-KR" dirty="0"/>
+              <a:t>/</a:t>
+            </a:r>
+            <a:r>
+              <a:rPr lang="ko-KR" altLang="en-US" dirty="0"/>
+              <a:t>패 했을 때의 걸리는 시간 통계 내보기</a:t>
+            </a:r>
+          </a:p>
+        </p:txBody>
+      </p:sp>
+      <p:sp>
+        <p:nvSpPr>
+          <p:cNvPr id="4" name="슬라이드 번호 개체 틀 3"/>
+          <p:cNvSpPr>
+            <a:spLocks noGrp="1"/>
+          </p:cNvSpPr>
+          <p:nvPr>
+            <p:ph type="sldNum" sz="quarter" idx="5"/>
+          </p:nvPr>
+        </p:nvSpPr>
+        <p:spPr/>
+        <p:txBody>
+          <a:bodyPr/>
+          <a:lstStyle/>
+          <a:p>
+            <a:fld id="{BE5E9F10-D1AF-43F7-8028-F2E1ABB3DCEC}" type="slidenum">
+              <a:rPr lang="ko-KR" altLang="en-US" smtClean="0"/>
+              <a:t>13</a:t>
+            </a:fld>
+            <a:endParaRPr lang="ko-KR" altLang="en-US"/>
+          </a:p>
+        </p:txBody>
+      </p:sp>
+    </p:spTree>
+    <p:extLst>
+      <p:ext uri="{BB962C8B-B14F-4D97-AF65-F5344CB8AC3E}">
+        <p14:creationId xmlns:p14="http://schemas.microsoft.com/office/powerpoint/2010/main" val="4102943153"/>
       </p:ext>
     </p:extLst>
   </p:cSld>
@@ -12684,7 +13006,7 @@
                     <a:p>
                       <a:pPr algn="ctr" fontAlgn="ctr"/>
                       <a:r>
-                        <a:rPr lang="en-US" altLang="ko-KR" sz="1100" u="none" strike="noStrike">
+                        <a:rPr lang="en-US" altLang="ko-KR" sz="1100" u="none" strike="noStrike" dirty="0">
                           <a:solidFill>
                             <a:schemeClr val="bg1"/>
                           </a:solidFill>
@@ -12692,7 +13014,7 @@
                         </a:rPr>
                         <a:t>7.32</a:t>
                       </a:r>
-                      <a:endParaRPr lang="en-US" altLang="ko-KR" sz="1100" b="0" i="0" u="none" strike="noStrike">
+                      <a:endParaRPr lang="en-US" altLang="ko-KR" sz="1100" b="0" i="0" u="none" strike="noStrike" dirty="0">
                         <a:solidFill>
                           <a:schemeClr val="bg1"/>
                         </a:solidFill>
@@ -13388,7 +13710,7 @@
                     <a:p>
                       <a:pPr algn="ctr" fontAlgn="ctr"/>
                       <a:r>
-                        <a:rPr lang="en-US" altLang="ko-KR" sz="1100" u="none" strike="noStrike">
+                        <a:rPr lang="en-US" altLang="ko-KR" sz="1100" u="none" strike="noStrike" dirty="0">
                           <a:solidFill>
                             <a:schemeClr val="bg1"/>
                           </a:solidFill>
@@ -13396,7 +13718,7 @@
                         </a:rPr>
                         <a:t>7.6</a:t>
                       </a:r>
-                      <a:endParaRPr lang="en-US" altLang="ko-KR" sz="1100" b="0" i="0" u="none" strike="noStrike">
+                      <a:endParaRPr lang="en-US" altLang="ko-KR" sz="1100" b="0" i="0" u="none" strike="noStrike" dirty="0">
                         <a:solidFill>
                           <a:schemeClr val="bg1"/>
                         </a:solidFill>
@@ -14092,7 +14414,7 @@
                     <a:p>
                       <a:pPr algn="ctr" fontAlgn="ctr"/>
                       <a:r>
-                        <a:rPr lang="en-US" altLang="ko-KR" sz="1100" u="none" strike="noStrike">
+                        <a:rPr lang="en-US" altLang="ko-KR" sz="1100" u="none" strike="noStrike" dirty="0">
                           <a:solidFill>
                             <a:schemeClr val="bg1"/>
                           </a:solidFill>
@@ -14100,7 +14422,7 @@
                         </a:rPr>
                         <a:t>7.73</a:t>
                       </a:r>
-                      <a:endParaRPr lang="en-US" altLang="ko-KR" sz="1100" b="0" i="0" u="none" strike="noStrike">
+                      <a:endParaRPr lang="en-US" altLang="ko-KR" sz="1100" b="0" i="0" u="none" strike="noStrike" dirty="0">
                         <a:solidFill>
                           <a:schemeClr val="bg1"/>
                         </a:solidFill>
@@ -14796,7 +15118,7 @@
                     <a:p>
                       <a:pPr algn="ctr" fontAlgn="ctr"/>
                       <a:r>
-                        <a:rPr lang="en-US" altLang="ko-KR" sz="1100" u="none" strike="noStrike">
+                        <a:rPr lang="en-US" altLang="ko-KR" sz="1100" u="none" strike="noStrike" dirty="0">
                           <a:solidFill>
                             <a:schemeClr val="bg1"/>
                           </a:solidFill>
@@ -14804,7 +15126,7 @@
                         </a:rPr>
                         <a:t>7.7</a:t>
                       </a:r>
-                      <a:endParaRPr lang="en-US" altLang="ko-KR" sz="1100" b="0" i="0" u="none" strike="noStrike">
+                      <a:endParaRPr lang="en-US" altLang="ko-KR" sz="1100" b="0" i="0" u="none" strike="noStrike" dirty="0">
                         <a:solidFill>
                           <a:schemeClr val="bg1"/>
                         </a:solidFill>
@@ -15500,7 +15822,7 @@
                     <a:p>
                       <a:pPr algn="ctr" fontAlgn="ctr"/>
                       <a:r>
-                        <a:rPr lang="en-US" altLang="ko-KR" sz="1100" u="none" strike="noStrike">
+                        <a:rPr lang="en-US" altLang="ko-KR" sz="1100" u="none" strike="noStrike" dirty="0">
                           <a:solidFill>
                             <a:schemeClr val="bg1"/>
                           </a:solidFill>
@@ -15508,7 +15830,7 @@
                         </a:rPr>
                         <a:t>7.57</a:t>
                       </a:r>
-                      <a:endParaRPr lang="en-US" altLang="ko-KR" sz="1100" b="0" i="0" u="none" strike="noStrike">
+                      <a:endParaRPr lang="en-US" altLang="ko-KR" sz="1100" b="0" i="0" u="none" strike="noStrike" dirty="0">
                         <a:solidFill>
                           <a:schemeClr val="bg1"/>
                         </a:solidFill>
@@ -16204,7 +16526,7 @@
                     <a:p>
                       <a:pPr algn="ctr" fontAlgn="ctr"/>
                       <a:r>
-                        <a:rPr lang="en-US" altLang="ko-KR" sz="1100" u="none" strike="noStrike">
+                        <a:rPr lang="en-US" altLang="ko-KR" sz="1100" u="none" strike="noStrike" dirty="0">
                           <a:solidFill>
                             <a:schemeClr val="bg1"/>
                           </a:solidFill>
@@ -16212,7 +16534,7 @@
                         </a:rPr>
                         <a:t>7.31</a:t>
                       </a:r>
-                      <a:endParaRPr lang="en-US" altLang="ko-KR" sz="1100" b="0" i="0" u="none" strike="noStrike">
+                      <a:endParaRPr lang="en-US" altLang="ko-KR" sz="1100" b="0" i="0" u="none" strike="noStrike" dirty="0">
                         <a:solidFill>
                           <a:schemeClr val="bg1"/>
                         </a:solidFill>
@@ -16881,7 +17203,7 @@
                     <a:p>
                       <a:pPr algn="ctr" fontAlgn="ctr"/>
                       <a:r>
-                        <a:rPr lang="en-US" altLang="ko-KR" sz="1100" u="none" strike="noStrike">
+                        <a:rPr lang="en-US" altLang="ko-KR" sz="1100" u="none" strike="noStrike" dirty="0">
                           <a:solidFill>
                             <a:schemeClr val="bg1"/>
                           </a:solidFill>
@@ -16889,7 +17211,7 @@
                         </a:rPr>
                         <a:t>7.28</a:t>
                       </a:r>
-                      <a:endParaRPr lang="en-US" altLang="ko-KR" sz="1100" b="0" i="0" u="none" strike="noStrike">
+                      <a:endParaRPr lang="en-US" altLang="ko-KR" sz="1100" b="0" i="0" u="none" strike="noStrike" dirty="0">
                         <a:solidFill>
                           <a:schemeClr val="bg1"/>
                         </a:solidFill>
@@ -17680,7 +18002,7 @@
                     <a:p>
                       <a:pPr algn="ctr" fontAlgn="ctr"/>
                       <a:r>
-                        <a:rPr lang="en-US" altLang="ko-KR" sz="1100" u="none" strike="noStrike">
+                        <a:rPr lang="en-US" altLang="ko-KR" sz="1100" u="none" strike="noStrike" dirty="0">
                           <a:solidFill>
                             <a:schemeClr val="bg1"/>
                           </a:solidFill>
@@ -17688,7 +18010,7 @@
                         </a:rPr>
                         <a:t>2.63</a:t>
                       </a:r>
-                      <a:endParaRPr lang="en-US" altLang="ko-KR" sz="1100" b="0" i="0" u="none" strike="noStrike">
+                      <a:endParaRPr lang="en-US" altLang="ko-KR" sz="1100" b="0" i="0" u="none" strike="noStrike" dirty="0">
                         <a:solidFill>
                           <a:schemeClr val="bg1"/>
                         </a:solidFill>
@@ -18224,7 +18546,7 @@
             <p:nvPr/>
           </p:nvPicPr>
           <p:blipFill>
-            <a:blip r:embed="rId2">
+            <a:blip r:embed="rId3">
               <a:extLst>
                 <a:ext uri="{28A0092B-C50C-407E-A947-70E740481C1C}">
                   <a14:useLocalDpi xmlns:a14="http://schemas.microsoft.com/office/drawing/2010/main" val="0"/>
@@ -22915,7 +23237,7 @@
             <p:nvPr/>
           </p:nvPicPr>
           <p:blipFill>
-            <a:blip r:embed="rId2">
+            <a:blip r:embed="rId3">
               <a:extLst>
                 <a:ext uri="{28A0092B-C50C-407E-A947-70E740481C1C}">
                   <a14:useLocalDpi xmlns:a14="http://schemas.microsoft.com/office/drawing/2010/main" val="0"/>
@@ -23334,7 +23656,7 @@
             <p:nvPr/>
           </p:nvPicPr>
           <p:blipFill>
-            <a:blip r:embed="rId3">
+            <a:blip r:embed="rId4">
               <a:extLst>
                 <a:ext uri="{28A0092B-C50C-407E-A947-70E740481C1C}">
                   <a14:useLocalDpi xmlns:a14="http://schemas.microsoft.com/office/drawing/2010/main" val="0"/>
@@ -23554,7 +23876,7 @@
             <p:nvPr/>
           </p:nvPicPr>
           <p:blipFill>
-            <a:blip r:embed="rId2">
+            <a:blip r:embed="rId3">
               <a:extLst>
                 <a:ext uri="{28A0092B-C50C-407E-A947-70E740481C1C}">
                   <a14:useLocalDpi xmlns:a14="http://schemas.microsoft.com/office/drawing/2010/main" val="0"/>
@@ -23989,7 +24311,7 @@
             <p:nvPr/>
           </p:nvPicPr>
           <p:blipFill>
-            <a:blip r:embed="rId3">
+            <a:blip r:embed="rId4">
               <a:extLst>
                 <a:ext uri="{28A0092B-C50C-407E-A947-70E740481C1C}">
                   <a14:useLocalDpi xmlns:a14="http://schemas.microsoft.com/office/drawing/2010/main" val="0"/>

</xml_diff>